<commit_message>
Dział 2 i 3 Update
</commit_message>
<xml_diff>
--- a/00_IMG_IK.pptx
+++ b/00_IMG_IK.pptx
@@ -7,6 +7,7 @@
   <p:sldIdLst>
     <p:sldId id="256" r:id="rId2"/>
     <p:sldId id="257" r:id="rId3"/>
+    <p:sldId id="258" r:id="rId4"/>
   </p:sldIdLst>
   <p:sldSz cx="9144000" cy="6858000" type="screen4x3"/>
   <p:notesSz cx="6858000" cy="9144000"/>
@@ -290,7 +291,7 @@
             <a:fld id="{66221E02-25CB-4963-84BC-0813985E7D90}" type="datetimeFigureOut">
               <a:rPr lang="pl-PL" smtClean="0"/>
               <a:pPr/>
-              <a:t>2015-03-20</a:t>
+              <a:t>2015-04-07</a:t>
             </a:fld>
             <a:endParaRPr lang="pl-PL"/>
           </a:p>
@@ -457,7 +458,7 @@
             <a:fld id="{66221E02-25CB-4963-84BC-0813985E7D90}" type="datetimeFigureOut">
               <a:rPr lang="pl-PL" smtClean="0"/>
               <a:pPr/>
-              <a:t>2015-03-20</a:t>
+              <a:t>2015-04-07</a:t>
             </a:fld>
             <a:endParaRPr lang="pl-PL"/>
           </a:p>
@@ -634,7 +635,7 @@
             <a:fld id="{66221E02-25CB-4963-84BC-0813985E7D90}" type="datetimeFigureOut">
               <a:rPr lang="pl-PL" smtClean="0"/>
               <a:pPr/>
-              <a:t>2015-03-20</a:t>
+              <a:t>2015-04-07</a:t>
             </a:fld>
             <a:endParaRPr lang="pl-PL"/>
           </a:p>
@@ -801,7 +802,7 @@
             <a:fld id="{66221E02-25CB-4963-84BC-0813985E7D90}" type="datetimeFigureOut">
               <a:rPr lang="pl-PL" smtClean="0"/>
               <a:pPr/>
-              <a:t>2015-03-20</a:t>
+              <a:t>2015-04-07</a:t>
             </a:fld>
             <a:endParaRPr lang="pl-PL"/>
           </a:p>
@@ -1044,7 +1045,7 @@
             <a:fld id="{66221E02-25CB-4963-84BC-0813985E7D90}" type="datetimeFigureOut">
               <a:rPr lang="pl-PL" smtClean="0"/>
               <a:pPr/>
-              <a:t>2015-03-20</a:t>
+              <a:t>2015-04-07</a:t>
             </a:fld>
             <a:endParaRPr lang="pl-PL"/>
           </a:p>
@@ -1329,7 +1330,7 @@
             <a:fld id="{66221E02-25CB-4963-84BC-0813985E7D90}" type="datetimeFigureOut">
               <a:rPr lang="pl-PL" smtClean="0"/>
               <a:pPr/>
-              <a:t>2015-03-20</a:t>
+              <a:t>2015-04-07</a:t>
             </a:fld>
             <a:endParaRPr lang="pl-PL"/>
           </a:p>
@@ -1748,7 +1749,7 @@
             <a:fld id="{66221E02-25CB-4963-84BC-0813985E7D90}" type="datetimeFigureOut">
               <a:rPr lang="pl-PL" smtClean="0"/>
               <a:pPr/>
-              <a:t>2015-03-20</a:t>
+              <a:t>2015-04-07</a:t>
             </a:fld>
             <a:endParaRPr lang="pl-PL"/>
           </a:p>
@@ -1863,7 +1864,7 @@
             <a:fld id="{66221E02-25CB-4963-84BC-0813985E7D90}" type="datetimeFigureOut">
               <a:rPr lang="pl-PL" smtClean="0"/>
               <a:pPr/>
-              <a:t>2015-03-20</a:t>
+              <a:t>2015-04-07</a:t>
             </a:fld>
             <a:endParaRPr lang="pl-PL"/>
           </a:p>
@@ -1955,7 +1956,7 @@
             <a:fld id="{66221E02-25CB-4963-84BC-0813985E7D90}" type="datetimeFigureOut">
               <a:rPr lang="pl-PL" smtClean="0"/>
               <a:pPr/>
-              <a:t>2015-03-20</a:t>
+              <a:t>2015-04-07</a:t>
             </a:fld>
             <a:endParaRPr lang="pl-PL"/>
           </a:p>
@@ -2229,7 +2230,7 @@
             <a:fld id="{66221E02-25CB-4963-84BC-0813985E7D90}" type="datetimeFigureOut">
               <a:rPr lang="pl-PL" smtClean="0"/>
               <a:pPr/>
-              <a:t>2015-03-20</a:t>
+              <a:t>2015-04-07</a:t>
             </a:fld>
             <a:endParaRPr lang="pl-PL"/>
           </a:p>
@@ -2479,7 +2480,7 @@
             <a:fld id="{66221E02-25CB-4963-84BC-0813985E7D90}" type="datetimeFigureOut">
               <a:rPr lang="pl-PL" smtClean="0"/>
               <a:pPr/>
-              <a:t>2015-03-20</a:t>
+              <a:t>2015-04-07</a:t>
             </a:fld>
             <a:endParaRPr lang="pl-PL"/>
           </a:p>
@@ -2689,7 +2690,7 @@
             <a:fld id="{66221E02-25CB-4963-84BC-0813985E7D90}" type="datetimeFigureOut">
               <a:rPr lang="pl-PL" smtClean="0"/>
               <a:pPr/>
-              <a:t>2015-03-20</a:t>
+              <a:t>2015-04-07</a:t>
             </a:fld>
             <a:endParaRPr lang="pl-PL"/>
           </a:p>
@@ -4578,8 +4579,8 @@
         </p:nvSpPr>
         <p:spPr>
           <a:xfrm>
-            <a:off x="1797860" y="2564904"/>
-            <a:ext cx="432048" cy="648072"/>
+            <a:off x="1547664" y="2564904"/>
+            <a:ext cx="936104" cy="648072"/>
           </a:xfrm>
           <a:prstGeom prst="rect">
             <a:avLst/>
@@ -10161,6 +10162,1216 @@
             <a:solidFill>
               <a:schemeClr val="tx1"/>
             </a:solidFill>
+          </a:ln>
+        </p:spPr>
+        <p:style>
+          <a:lnRef idx="1">
+            <a:schemeClr val="accent1"/>
+          </a:lnRef>
+          <a:fillRef idx="0">
+            <a:schemeClr val="accent1"/>
+          </a:fillRef>
+          <a:effectRef idx="0">
+            <a:schemeClr val="accent1"/>
+          </a:effectRef>
+          <a:fontRef idx="minor">
+            <a:schemeClr val="tx1"/>
+          </a:fontRef>
+        </p:style>
+      </p:cxnSp>
+    </p:spTree>
+  </p:cSld>
+  <p:clrMapOvr>
+    <a:masterClrMapping/>
+  </p:clrMapOvr>
+</p:sld>
+</file>
+
+<file path=ppt/slides/slide3.xml><?xml version="1.0" encoding="utf-8"?>
+<p:sld xmlns:a="http://schemas.openxmlformats.org/drawingml/2006/main" xmlns:r="http://schemas.openxmlformats.org/officeDocument/2006/relationships" xmlns:p="http://schemas.openxmlformats.org/presentationml/2006/main">
+  <p:cSld>
+    <p:spTree>
+      <p:nvGrpSpPr>
+        <p:cNvPr id="1" name=""/>
+        <p:cNvGrpSpPr/>
+        <p:nvPr/>
+      </p:nvGrpSpPr>
+      <p:grpSpPr>
+        <a:xfrm>
+          <a:off x="0" y="0"/>
+          <a:ext cx="0" cy="0"/>
+          <a:chOff x="0" y="0"/>
+          <a:chExt cx="0" cy="0"/>
+        </a:xfrm>
+      </p:grpSpPr>
+      <p:sp>
+        <p:nvSpPr>
+          <p:cNvPr id="4" name="Prostokąt zaokrąglony 3"/>
+          <p:cNvSpPr/>
+          <p:nvPr/>
+        </p:nvSpPr>
+        <p:spPr>
+          <a:xfrm>
+            <a:off x="2411760" y="404664"/>
+            <a:ext cx="1512168" cy="2952328"/>
+          </a:xfrm>
+          <a:prstGeom prst="roundRect">
+            <a:avLst>
+              <a:gd name="adj" fmla="val 42776"/>
+            </a:avLst>
+          </a:prstGeom>
+          <a:noFill/>
+          <a:ln>
+            <a:solidFill>
+              <a:schemeClr val="tx1">
+                <a:lumMod val="95000"/>
+                <a:lumOff val="5000"/>
+              </a:schemeClr>
+            </a:solidFill>
+          </a:ln>
+        </p:spPr>
+        <p:style>
+          <a:lnRef idx="2">
+            <a:schemeClr val="accent1">
+              <a:shade val="50000"/>
+            </a:schemeClr>
+          </a:lnRef>
+          <a:fillRef idx="1">
+            <a:schemeClr val="accent1"/>
+          </a:fillRef>
+          <a:effectRef idx="0">
+            <a:schemeClr val="accent1"/>
+          </a:effectRef>
+          <a:fontRef idx="minor">
+            <a:schemeClr val="lt1"/>
+          </a:fontRef>
+        </p:style>
+        <p:txBody>
+          <a:bodyPr rtlCol="0" anchor="ctr"/>
+          <a:lstStyle/>
+          <a:p>
+            <a:pPr algn="ctr"/>
+            <a:endParaRPr lang="pl-PL"/>
+          </a:p>
+        </p:txBody>
+      </p:sp>
+      <p:sp>
+        <p:nvSpPr>
+          <p:cNvPr id="9" name="Prostokąt 8"/>
+          <p:cNvSpPr/>
+          <p:nvPr/>
+        </p:nvSpPr>
+        <p:spPr>
+          <a:xfrm>
+            <a:off x="3928120" y="2492896"/>
+            <a:ext cx="648072" cy="288032"/>
+          </a:xfrm>
+          <a:prstGeom prst="rect">
+            <a:avLst/>
+          </a:prstGeom>
+          <a:noFill/>
+          <a:ln w="25400">
+            <a:solidFill>
+              <a:schemeClr val="tx1"/>
+            </a:solidFill>
+          </a:ln>
+        </p:spPr>
+        <p:style>
+          <a:lnRef idx="2">
+            <a:schemeClr val="accent1">
+              <a:shade val="50000"/>
+            </a:schemeClr>
+          </a:lnRef>
+          <a:fillRef idx="1">
+            <a:schemeClr val="accent1"/>
+          </a:fillRef>
+          <a:effectRef idx="0">
+            <a:schemeClr val="accent1"/>
+          </a:effectRef>
+          <a:fontRef idx="minor">
+            <a:schemeClr val="lt1"/>
+          </a:fontRef>
+        </p:style>
+        <p:txBody>
+          <a:bodyPr rtlCol="0" anchor="ctr"/>
+          <a:lstStyle/>
+          <a:p>
+            <a:pPr algn="ctr"/>
+            <a:endParaRPr lang="pl-PL"/>
+          </a:p>
+        </p:txBody>
+      </p:sp>
+      <p:sp>
+        <p:nvSpPr>
+          <p:cNvPr id="10" name="Prostokąt 9"/>
+          <p:cNvSpPr/>
+          <p:nvPr/>
+        </p:nvSpPr>
+        <p:spPr>
+          <a:xfrm>
+            <a:off x="3923928" y="1052736"/>
+            <a:ext cx="648072" cy="288032"/>
+          </a:xfrm>
+          <a:prstGeom prst="rect">
+            <a:avLst/>
+          </a:prstGeom>
+          <a:noFill/>
+          <a:ln w="25400">
+            <a:solidFill>
+              <a:schemeClr val="tx1"/>
+            </a:solidFill>
+          </a:ln>
+        </p:spPr>
+        <p:style>
+          <a:lnRef idx="2">
+            <a:schemeClr val="accent1">
+              <a:shade val="50000"/>
+            </a:schemeClr>
+          </a:lnRef>
+          <a:fillRef idx="1">
+            <a:schemeClr val="accent1"/>
+          </a:fillRef>
+          <a:effectRef idx="0">
+            <a:schemeClr val="accent1"/>
+          </a:effectRef>
+          <a:fontRef idx="minor">
+            <a:schemeClr val="lt1"/>
+          </a:fontRef>
+        </p:style>
+        <p:txBody>
+          <a:bodyPr rtlCol="0" anchor="ctr"/>
+          <a:lstStyle/>
+          <a:p>
+            <a:pPr algn="ctr"/>
+            <a:endParaRPr lang="pl-PL"/>
+          </a:p>
+        </p:txBody>
+      </p:sp>
+      <p:sp>
+        <p:nvSpPr>
+          <p:cNvPr id="11" name="Prostokąt 10"/>
+          <p:cNvSpPr/>
+          <p:nvPr/>
+        </p:nvSpPr>
+        <p:spPr>
+          <a:xfrm>
+            <a:off x="2708300" y="1641500"/>
+            <a:ext cx="936104" cy="792088"/>
+          </a:xfrm>
+          <a:prstGeom prst="rect">
+            <a:avLst/>
+          </a:prstGeom>
+          <a:noFill/>
+          <a:ln>
+            <a:solidFill>
+              <a:schemeClr val="bg1">
+                <a:lumMod val="50000"/>
+              </a:schemeClr>
+            </a:solidFill>
+          </a:ln>
+        </p:spPr>
+        <p:style>
+          <a:lnRef idx="2">
+            <a:schemeClr val="accent1">
+              <a:shade val="50000"/>
+            </a:schemeClr>
+          </a:lnRef>
+          <a:fillRef idx="1">
+            <a:schemeClr val="accent1"/>
+          </a:fillRef>
+          <a:effectRef idx="0">
+            <a:schemeClr val="accent1"/>
+          </a:effectRef>
+          <a:fontRef idx="minor">
+            <a:schemeClr val="lt1"/>
+          </a:fontRef>
+        </p:style>
+        <p:txBody>
+          <a:bodyPr rtlCol="0" anchor="ctr"/>
+          <a:lstStyle/>
+          <a:p>
+            <a:pPr algn="ctr"/>
+            <a:endParaRPr lang="pl-PL"/>
+          </a:p>
+        </p:txBody>
+      </p:sp>
+      <p:cxnSp>
+        <p:nvCxnSpPr>
+          <p:cNvPr id="12" name="Łącznik prosty ze strzałką 11"/>
+          <p:cNvCxnSpPr/>
+          <p:nvPr/>
+        </p:nvCxnSpPr>
+        <p:spPr>
+          <a:xfrm flipV="1">
+            <a:off x="4055244" y="1199816"/>
+            <a:ext cx="457200" cy="0"/>
+          </a:xfrm>
+          <a:prstGeom prst="straightConnector1">
+            <a:avLst/>
+          </a:prstGeom>
+          <a:ln w="44450">
+            <a:solidFill>
+              <a:schemeClr val="tx1"/>
+            </a:solidFill>
+            <a:tailEnd type="triangle"/>
+          </a:ln>
+        </p:spPr>
+        <p:style>
+          <a:lnRef idx="1">
+            <a:schemeClr val="accent1"/>
+          </a:lnRef>
+          <a:fillRef idx="0">
+            <a:schemeClr val="accent1"/>
+          </a:fillRef>
+          <a:effectRef idx="0">
+            <a:schemeClr val="accent1"/>
+          </a:effectRef>
+          <a:fontRef idx="minor">
+            <a:schemeClr val="tx1"/>
+          </a:fontRef>
+        </p:style>
+      </p:cxnSp>
+      <p:cxnSp>
+        <p:nvCxnSpPr>
+          <p:cNvPr id="13" name="Łącznik prosty ze strzałką 12"/>
+          <p:cNvCxnSpPr/>
+          <p:nvPr/>
+        </p:nvCxnSpPr>
+        <p:spPr>
+          <a:xfrm flipH="1">
+            <a:off x="3995936" y="2636912"/>
+            <a:ext cx="457200" cy="0"/>
+          </a:xfrm>
+          <a:prstGeom prst="straightConnector1">
+            <a:avLst/>
+          </a:prstGeom>
+          <a:ln w="44450">
+            <a:solidFill>
+              <a:schemeClr val="tx1"/>
+            </a:solidFill>
+            <a:tailEnd type="triangle"/>
+          </a:ln>
+        </p:spPr>
+        <p:style>
+          <a:lnRef idx="1">
+            <a:schemeClr val="accent1"/>
+          </a:lnRef>
+          <a:fillRef idx="0">
+            <a:schemeClr val="accent1"/>
+          </a:fillRef>
+          <a:effectRef idx="0">
+            <a:schemeClr val="accent1"/>
+          </a:effectRef>
+          <a:fontRef idx="minor">
+            <a:schemeClr val="tx1"/>
+          </a:fontRef>
+        </p:style>
+      </p:cxnSp>
+      <p:sp>
+        <p:nvSpPr>
+          <p:cNvPr id="14" name="Łuk 13"/>
+          <p:cNvSpPr/>
+          <p:nvPr/>
+        </p:nvSpPr>
+        <p:spPr>
+          <a:xfrm rot="16200000">
+            <a:off x="3131840" y="1124744"/>
+            <a:ext cx="720080" cy="864096"/>
+          </a:xfrm>
+          <a:prstGeom prst="arc">
+            <a:avLst/>
+          </a:prstGeom>
+          <a:ln w="44450">
+            <a:solidFill>
+              <a:schemeClr val="tx1"/>
+            </a:solidFill>
+            <a:tailEnd type="triangle"/>
+          </a:ln>
+        </p:spPr>
+        <p:style>
+          <a:lnRef idx="1">
+            <a:schemeClr val="accent1"/>
+          </a:lnRef>
+          <a:fillRef idx="0">
+            <a:schemeClr val="accent1"/>
+          </a:fillRef>
+          <a:effectRef idx="0">
+            <a:schemeClr val="accent1"/>
+          </a:effectRef>
+          <a:fontRef idx="minor">
+            <a:schemeClr val="tx1"/>
+          </a:fontRef>
+        </p:style>
+        <p:txBody>
+          <a:bodyPr rtlCol="0" anchor="ctr"/>
+          <a:lstStyle/>
+          <a:p>
+            <a:pPr algn="ctr"/>
+            <a:endParaRPr lang="pl-PL"/>
+          </a:p>
+        </p:txBody>
+      </p:sp>
+      <p:sp>
+        <p:nvSpPr>
+          <p:cNvPr id="15" name="Łuk 14"/>
+          <p:cNvSpPr/>
+          <p:nvPr/>
+        </p:nvSpPr>
+        <p:spPr>
+          <a:xfrm rot="16200000">
+            <a:off x="3419872" y="1844824"/>
+            <a:ext cx="576064" cy="1152128"/>
+          </a:xfrm>
+          <a:prstGeom prst="arc">
+            <a:avLst>
+              <a:gd name="adj1" fmla="val 10803197"/>
+              <a:gd name="adj2" fmla="val 15871558"/>
+            </a:avLst>
+          </a:prstGeom>
+          <a:ln w="44450">
+            <a:solidFill>
+              <a:schemeClr val="tx1"/>
+            </a:solidFill>
+            <a:tailEnd type="triangle"/>
+          </a:ln>
+        </p:spPr>
+        <p:style>
+          <a:lnRef idx="1">
+            <a:schemeClr val="accent1"/>
+          </a:lnRef>
+          <a:fillRef idx="0">
+            <a:schemeClr val="accent1"/>
+          </a:fillRef>
+          <a:effectRef idx="0">
+            <a:schemeClr val="accent1"/>
+          </a:effectRef>
+          <a:fontRef idx="minor">
+            <a:schemeClr val="tx1"/>
+          </a:fontRef>
+        </p:style>
+        <p:txBody>
+          <a:bodyPr rtlCol="0" anchor="ctr"/>
+          <a:lstStyle/>
+          <a:p>
+            <a:pPr algn="ctr"/>
+            <a:endParaRPr lang="pl-PL"/>
+          </a:p>
+        </p:txBody>
+      </p:sp>
+      <p:sp>
+        <p:nvSpPr>
+          <p:cNvPr id="16" name="Prostokąt 15"/>
+          <p:cNvSpPr/>
+          <p:nvPr/>
+        </p:nvSpPr>
+        <p:spPr>
+          <a:xfrm>
+            <a:off x="323528" y="1628800"/>
+            <a:ext cx="1296144" cy="792088"/>
+          </a:xfrm>
+          <a:prstGeom prst="rect">
+            <a:avLst/>
+          </a:prstGeom>
+          <a:noFill/>
+          <a:ln>
+            <a:solidFill>
+              <a:schemeClr val="bg1">
+                <a:lumMod val="50000"/>
+              </a:schemeClr>
+            </a:solidFill>
+          </a:ln>
+        </p:spPr>
+        <p:style>
+          <a:lnRef idx="2">
+            <a:schemeClr val="accent1">
+              <a:shade val="50000"/>
+            </a:schemeClr>
+          </a:lnRef>
+          <a:fillRef idx="1">
+            <a:schemeClr val="accent1"/>
+          </a:fillRef>
+          <a:effectRef idx="0">
+            <a:schemeClr val="accent1"/>
+          </a:effectRef>
+          <a:fontRef idx="minor">
+            <a:schemeClr val="lt1"/>
+          </a:fontRef>
+        </p:style>
+        <p:txBody>
+          <a:bodyPr rtlCol="0" anchor="ctr"/>
+          <a:lstStyle/>
+          <a:p>
+            <a:pPr algn="ctr"/>
+            <a:endParaRPr lang="pl-PL"/>
+          </a:p>
+        </p:txBody>
+      </p:sp>
+      <p:sp>
+        <p:nvSpPr>
+          <p:cNvPr id="17" name="Prostokąt 16"/>
+          <p:cNvSpPr/>
+          <p:nvPr/>
+        </p:nvSpPr>
+        <p:spPr>
+          <a:xfrm>
+            <a:off x="467544" y="1124744"/>
+            <a:ext cx="144016" cy="1728192"/>
+          </a:xfrm>
+          <a:prstGeom prst="rect">
+            <a:avLst/>
+          </a:prstGeom>
+          <a:solidFill>
+            <a:schemeClr val="bg1">
+              <a:lumMod val="85000"/>
+            </a:schemeClr>
+          </a:solidFill>
+          <a:ln>
+            <a:solidFill>
+              <a:schemeClr val="bg1">
+                <a:lumMod val="50000"/>
+              </a:schemeClr>
+            </a:solidFill>
+          </a:ln>
+        </p:spPr>
+        <p:style>
+          <a:lnRef idx="2">
+            <a:schemeClr val="accent1">
+              <a:shade val="50000"/>
+            </a:schemeClr>
+          </a:lnRef>
+          <a:fillRef idx="1">
+            <a:schemeClr val="accent1"/>
+          </a:fillRef>
+          <a:effectRef idx="0">
+            <a:schemeClr val="accent1"/>
+          </a:effectRef>
+          <a:fontRef idx="minor">
+            <a:schemeClr val="lt1"/>
+          </a:fontRef>
+        </p:style>
+        <p:txBody>
+          <a:bodyPr rtlCol="0" anchor="ctr"/>
+          <a:lstStyle/>
+          <a:p>
+            <a:pPr algn="ctr"/>
+            <a:endParaRPr lang="pl-PL"/>
+          </a:p>
+        </p:txBody>
+      </p:sp>
+      <p:sp>
+        <p:nvSpPr>
+          <p:cNvPr id="18" name="Prostokąt 17"/>
+          <p:cNvSpPr/>
+          <p:nvPr/>
+        </p:nvSpPr>
+        <p:spPr>
+          <a:xfrm>
+            <a:off x="764084" y="1124744"/>
+            <a:ext cx="144016" cy="1728192"/>
+          </a:xfrm>
+          <a:prstGeom prst="rect">
+            <a:avLst/>
+          </a:prstGeom>
+          <a:solidFill>
+            <a:schemeClr val="bg1">
+              <a:lumMod val="85000"/>
+            </a:schemeClr>
+          </a:solidFill>
+          <a:ln>
+            <a:solidFill>
+              <a:schemeClr val="bg1">
+                <a:lumMod val="50000"/>
+              </a:schemeClr>
+            </a:solidFill>
+          </a:ln>
+        </p:spPr>
+        <p:style>
+          <a:lnRef idx="2">
+            <a:schemeClr val="accent1">
+              <a:shade val="50000"/>
+            </a:schemeClr>
+          </a:lnRef>
+          <a:fillRef idx="1">
+            <a:schemeClr val="accent1"/>
+          </a:fillRef>
+          <a:effectRef idx="0">
+            <a:schemeClr val="accent1"/>
+          </a:effectRef>
+          <a:fontRef idx="minor">
+            <a:schemeClr val="lt1"/>
+          </a:fontRef>
+        </p:style>
+        <p:txBody>
+          <a:bodyPr rtlCol="0" anchor="ctr"/>
+          <a:lstStyle/>
+          <a:p>
+            <a:pPr algn="ctr"/>
+            <a:endParaRPr lang="pl-PL"/>
+          </a:p>
+        </p:txBody>
+      </p:sp>
+      <p:sp>
+        <p:nvSpPr>
+          <p:cNvPr id="19" name="Prostokąt 18"/>
+          <p:cNvSpPr/>
+          <p:nvPr/>
+        </p:nvSpPr>
+        <p:spPr>
+          <a:xfrm>
+            <a:off x="1052116" y="1124744"/>
+            <a:ext cx="144016" cy="1728192"/>
+          </a:xfrm>
+          <a:prstGeom prst="rect">
+            <a:avLst/>
+          </a:prstGeom>
+          <a:solidFill>
+            <a:schemeClr val="bg1">
+              <a:lumMod val="85000"/>
+            </a:schemeClr>
+          </a:solidFill>
+          <a:ln>
+            <a:solidFill>
+              <a:schemeClr val="bg1">
+                <a:lumMod val="50000"/>
+              </a:schemeClr>
+            </a:solidFill>
+          </a:ln>
+        </p:spPr>
+        <p:style>
+          <a:lnRef idx="2">
+            <a:schemeClr val="accent1">
+              <a:shade val="50000"/>
+            </a:schemeClr>
+          </a:lnRef>
+          <a:fillRef idx="1">
+            <a:schemeClr val="accent1"/>
+          </a:fillRef>
+          <a:effectRef idx="0">
+            <a:schemeClr val="accent1"/>
+          </a:effectRef>
+          <a:fontRef idx="minor">
+            <a:schemeClr val="lt1"/>
+          </a:fontRef>
+        </p:style>
+        <p:txBody>
+          <a:bodyPr rtlCol="0" anchor="ctr"/>
+          <a:lstStyle/>
+          <a:p>
+            <a:pPr algn="ctr"/>
+            <a:endParaRPr lang="pl-PL"/>
+          </a:p>
+        </p:txBody>
+      </p:sp>
+      <p:sp>
+        <p:nvSpPr>
+          <p:cNvPr id="20" name="Prostokąt 19"/>
+          <p:cNvSpPr/>
+          <p:nvPr/>
+        </p:nvSpPr>
+        <p:spPr>
+          <a:xfrm>
+            <a:off x="1340148" y="1124744"/>
+            <a:ext cx="144016" cy="1728192"/>
+          </a:xfrm>
+          <a:prstGeom prst="rect">
+            <a:avLst/>
+          </a:prstGeom>
+          <a:solidFill>
+            <a:schemeClr val="bg1">
+              <a:lumMod val="85000"/>
+            </a:schemeClr>
+          </a:solidFill>
+          <a:ln>
+            <a:solidFill>
+              <a:schemeClr val="bg1">
+                <a:lumMod val="50000"/>
+              </a:schemeClr>
+            </a:solidFill>
+          </a:ln>
+        </p:spPr>
+        <p:style>
+          <a:lnRef idx="2">
+            <a:schemeClr val="accent1">
+              <a:shade val="50000"/>
+            </a:schemeClr>
+          </a:lnRef>
+          <a:fillRef idx="1">
+            <a:schemeClr val="accent1"/>
+          </a:fillRef>
+          <a:effectRef idx="0">
+            <a:schemeClr val="accent1"/>
+          </a:effectRef>
+          <a:fontRef idx="minor">
+            <a:schemeClr val="lt1"/>
+          </a:fontRef>
+        </p:style>
+        <p:txBody>
+          <a:bodyPr rtlCol="0" anchor="ctr"/>
+          <a:lstStyle/>
+          <a:p>
+            <a:pPr algn="ctr"/>
+            <a:endParaRPr lang="pl-PL"/>
+          </a:p>
+        </p:txBody>
+      </p:sp>
+      <p:cxnSp>
+        <p:nvCxnSpPr>
+          <p:cNvPr id="21" name="Łącznik prosty ze strzałką 20"/>
+          <p:cNvCxnSpPr/>
+          <p:nvPr/>
+        </p:nvCxnSpPr>
+        <p:spPr>
+          <a:xfrm flipV="1">
+            <a:off x="1403648" y="1658392"/>
+            <a:ext cx="0" cy="711696"/>
+          </a:xfrm>
+          <a:prstGeom prst="straightConnector1">
+            <a:avLst/>
+          </a:prstGeom>
+          <a:ln w="44450">
+            <a:solidFill>
+              <a:schemeClr val="tx1"/>
+            </a:solidFill>
+            <a:tailEnd type="triangle"/>
+          </a:ln>
+        </p:spPr>
+        <p:style>
+          <a:lnRef idx="1">
+            <a:schemeClr val="accent1"/>
+          </a:lnRef>
+          <a:fillRef idx="0">
+            <a:schemeClr val="accent1"/>
+          </a:fillRef>
+          <a:effectRef idx="0">
+            <a:schemeClr val="accent1"/>
+          </a:effectRef>
+          <a:fontRef idx="minor">
+            <a:schemeClr val="tx1"/>
+          </a:fontRef>
+        </p:style>
+      </p:cxnSp>
+      <p:cxnSp>
+        <p:nvCxnSpPr>
+          <p:cNvPr id="23" name="Łącznik prosty ze strzałką 22"/>
+          <p:cNvCxnSpPr/>
+          <p:nvPr/>
+        </p:nvCxnSpPr>
+        <p:spPr>
+          <a:xfrm flipV="1">
+            <a:off x="1115616" y="1650008"/>
+            <a:ext cx="0" cy="711696"/>
+          </a:xfrm>
+          <a:prstGeom prst="straightConnector1">
+            <a:avLst/>
+          </a:prstGeom>
+          <a:ln w="44450">
+            <a:solidFill>
+              <a:schemeClr val="tx1"/>
+            </a:solidFill>
+            <a:tailEnd type="triangle"/>
+          </a:ln>
+        </p:spPr>
+        <p:style>
+          <a:lnRef idx="1">
+            <a:schemeClr val="accent1"/>
+          </a:lnRef>
+          <a:fillRef idx="0">
+            <a:schemeClr val="accent1"/>
+          </a:fillRef>
+          <a:effectRef idx="0">
+            <a:schemeClr val="accent1"/>
+          </a:effectRef>
+          <a:fontRef idx="minor">
+            <a:schemeClr val="tx1"/>
+          </a:fontRef>
+        </p:style>
+      </p:cxnSp>
+      <p:cxnSp>
+        <p:nvCxnSpPr>
+          <p:cNvPr id="24" name="Łącznik prosty ze strzałką 23"/>
+          <p:cNvCxnSpPr/>
+          <p:nvPr/>
+        </p:nvCxnSpPr>
+        <p:spPr>
+          <a:xfrm flipV="1">
+            <a:off x="840284" y="1654200"/>
+            <a:ext cx="0" cy="711696"/>
+          </a:xfrm>
+          <a:prstGeom prst="straightConnector1">
+            <a:avLst/>
+          </a:prstGeom>
+          <a:ln w="44450">
+            <a:solidFill>
+              <a:schemeClr val="tx1"/>
+            </a:solidFill>
+            <a:tailEnd type="triangle"/>
+          </a:ln>
+        </p:spPr>
+        <p:style>
+          <a:lnRef idx="1">
+            <a:schemeClr val="accent1"/>
+          </a:lnRef>
+          <a:fillRef idx="0">
+            <a:schemeClr val="accent1"/>
+          </a:fillRef>
+          <a:effectRef idx="0">
+            <a:schemeClr val="accent1"/>
+          </a:effectRef>
+          <a:fontRef idx="minor">
+            <a:schemeClr val="tx1"/>
+          </a:fontRef>
+        </p:style>
+      </p:cxnSp>
+      <p:cxnSp>
+        <p:nvCxnSpPr>
+          <p:cNvPr id="25" name="Łącznik prosty ze strzałką 24"/>
+          <p:cNvCxnSpPr/>
+          <p:nvPr/>
+        </p:nvCxnSpPr>
+        <p:spPr>
+          <a:xfrm flipV="1">
+            <a:off x="539552" y="1654200"/>
+            <a:ext cx="0" cy="711696"/>
+          </a:xfrm>
+          <a:prstGeom prst="straightConnector1">
+            <a:avLst/>
+          </a:prstGeom>
+          <a:ln w="44450">
+            <a:solidFill>
+              <a:schemeClr val="tx1"/>
+            </a:solidFill>
+            <a:tailEnd type="triangle"/>
+          </a:ln>
+        </p:spPr>
+        <p:style>
+          <a:lnRef idx="1">
+            <a:schemeClr val="accent1"/>
+          </a:lnRef>
+          <a:fillRef idx="0">
+            <a:schemeClr val="accent1"/>
+          </a:fillRef>
+          <a:effectRef idx="0">
+            <a:schemeClr val="accent1"/>
+          </a:effectRef>
+          <a:fontRef idx="minor">
+            <a:schemeClr val="tx1"/>
+          </a:fontRef>
+        </p:style>
+      </p:cxnSp>
+      <p:sp>
+        <p:nvSpPr>
+          <p:cNvPr id="26" name="TextBox 34"/>
+          <p:cNvSpPr txBox="1"/>
+          <p:nvPr/>
+        </p:nvSpPr>
+        <p:spPr>
+          <a:xfrm>
+            <a:off x="179512" y="148570"/>
+            <a:ext cx="347340" cy="400110"/>
+          </a:xfrm>
+          <a:prstGeom prst="rect">
+            <a:avLst/>
+          </a:prstGeom>
+          <a:noFill/>
+        </p:spPr>
+        <p:txBody>
+          <a:bodyPr wrap="square" rtlCol="0">
+            <a:spAutoFit/>
+          </a:bodyPr>
+          <a:lstStyle/>
+          <a:p>
+            <a:r>
+              <a:rPr lang="pl-PL" sz="2000" b="1" dirty="0" smtClean="0"/>
+              <a:t>A</a:t>
+            </a:r>
+            <a:endParaRPr lang="en-US" sz="2000" b="1" dirty="0"/>
+          </a:p>
+        </p:txBody>
+      </p:sp>
+      <p:sp>
+        <p:nvSpPr>
+          <p:cNvPr id="27" name="TextBox 34"/>
+          <p:cNvSpPr txBox="1"/>
+          <p:nvPr/>
+        </p:nvSpPr>
+        <p:spPr>
+          <a:xfrm>
+            <a:off x="2136428" y="142032"/>
+            <a:ext cx="347340" cy="400110"/>
+          </a:xfrm>
+          <a:prstGeom prst="rect">
+            <a:avLst/>
+          </a:prstGeom>
+          <a:noFill/>
+        </p:spPr>
+        <p:txBody>
+          <a:bodyPr wrap="square" rtlCol="0">
+            <a:spAutoFit/>
+          </a:bodyPr>
+          <a:lstStyle/>
+          <a:p>
+            <a:r>
+              <a:rPr lang="pl-PL" sz="2000" b="1" dirty="0" smtClean="0"/>
+              <a:t>B</a:t>
+            </a:r>
+            <a:endParaRPr lang="en-US" sz="2000" b="1" dirty="0"/>
+          </a:p>
+        </p:txBody>
+      </p:sp>
+      <p:sp>
+        <p:nvSpPr>
+          <p:cNvPr id="29" name="pole tekstowe 28"/>
+          <p:cNvSpPr txBox="1"/>
+          <p:nvPr/>
+        </p:nvSpPr>
+        <p:spPr>
+          <a:xfrm>
+            <a:off x="1403648" y="3284984"/>
+            <a:ext cx="1152128" cy="523220"/>
+          </a:xfrm>
+          <a:prstGeom prst="rect">
+            <a:avLst/>
+          </a:prstGeom>
+          <a:noFill/>
+        </p:spPr>
+        <p:txBody>
+          <a:bodyPr wrap="square" rtlCol="0">
+            <a:spAutoFit/>
+          </a:bodyPr>
+          <a:lstStyle/>
+          <a:p>
+            <a:pPr algn="ctr"/>
+            <a:r>
+              <a:rPr lang="pl-PL" sz="1400" dirty="0" smtClean="0"/>
+              <a:t>r</a:t>
+            </a:r>
+            <a:r>
+              <a:rPr lang="pl-PL" sz="1400" dirty="0" smtClean="0"/>
+              <a:t>dzeń </a:t>
+            </a:r>
+            <a:r>
+              <a:rPr lang="pl-PL" sz="1400" dirty="0" smtClean="0"/>
+              <a:t>reaktora</a:t>
+            </a:r>
+            <a:endParaRPr lang="pl-PL" sz="1400" dirty="0"/>
+          </a:p>
+        </p:txBody>
+      </p:sp>
+      <p:cxnSp>
+        <p:nvCxnSpPr>
+          <p:cNvPr id="30" name="Łącznik prosty ze strzałką 29"/>
+          <p:cNvCxnSpPr>
+            <a:stCxn id="29" idx="0"/>
+          </p:cNvCxnSpPr>
+          <p:nvPr/>
+        </p:nvCxnSpPr>
+        <p:spPr>
+          <a:xfrm flipV="1">
+            <a:off x="1979712" y="2492896"/>
+            <a:ext cx="720080" cy="792088"/>
+          </a:xfrm>
+          <a:prstGeom prst="straightConnector1">
+            <a:avLst/>
+          </a:prstGeom>
+          <a:ln>
+            <a:solidFill>
+              <a:schemeClr val="tx1"/>
+            </a:solidFill>
+            <a:tailEnd type="triangle"/>
+          </a:ln>
+        </p:spPr>
+        <p:style>
+          <a:lnRef idx="1">
+            <a:schemeClr val="accent1"/>
+          </a:lnRef>
+          <a:fillRef idx="0">
+            <a:schemeClr val="accent1"/>
+          </a:fillRef>
+          <a:effectRef idx="0">
+            <a:schemeClr val="accent1"/>
+          </a:effectRef>
+          <a:fontRef idx="minor">
+            <a:schemeClr val="tx1"/>
+          </a:fontRef>
+        </p:style>
+      </p:cxnSp>
+      <p:cxnSp>
+        <p:nvCxnSpPr>
+          <p:cNvPr id="34" name="Łącznik prosty ze strzałką 33"/>
+          <p:cNvCxnSpPr>
+            <a:stCxn id="29" idx="0"/>
+          </p:cNvCxnSpPr>
+          <p:nvPr/>
+        </p:nvCxnSpPr>
+        <p:spPr>
+          <a:xfrm flipH="1" flipV="1">
+            <a:off x="1619672" y="2492896"/>
+            <a:ext cx="360040" cy="792088"/>
+          </a:xfrm>
+          <a:prstGeom prst="straightConnector1">
+            <a:avLst/>
+          </a:prstGeom>
+          <a:ln>
+            <a:solidFill>
+              <a:schemeClr val="tx1"/>
+            </a:solidFill>
+            <a:tailEnd type="triangle"/>
+          </a:ln>
+        </p:spPr>
+        <p:style>
+          <a:lnRef idx="1">
+            <a:schemeClr val="accent1"/>
+          </a:lnRef>
+          <a:fillRef idx="0">
+            <a:schemeClr val="accent1"/>
+          </a:fillRef>
+          <a:effectRef idx="0">
+            <a:schemeClr val="accent1"/>
+          </a:effectRef>
+          <a:fontRef idx="minor">
+            <a:schemeClr val="tx1"/>
+          </a:fontRef>
+        </p:style>
+      </p:cxnSp>
+      <p:sp>
+        <p:nvSpPr>
+          <p:cNvPr id="37" name="pole tekstowe 36"/>
+          <p:cNvSpPr txBox="1"/>
+          <p:nvPr/>
+        </p:nvSpPr>
+        <p:spPr>
+          <a:xfrm>
+            <a:off x="0" y="3429000"/>
+            <a:ext cx="1152128" cy="307777"/>
+          </a:xfrm>
+          <a:prstGeom prst="rect">
+            <a:avLst/>
+          </a:prstGeom>
+          <a:noFill/>
+        </p:spPr>
+        <p:txBody>
+          <a:bodyPr wrap="square" rtlCol="0">
+            <a:spAutoFit/>
+          </a:bodyPr>
+          <a:lstStyle/>
+          <a:p>
+            <a:pPr algn="ctr"/>
+            <a:r>
+              <a:rPr lang="pl-PL" sz="1400" dirty="0" smtClean="0"/>
+              <a:t>kanały</a:t>
+            </a:r>
+            <a:endParaRPr lang="pl-PL" sz="1400" dirty="0"/>
+          </a:p>
+        </p:txBody>
+      </p:sp>
+      <p:sp>
+        <p:nvSpPr>
+          <p:cNvPr id="38" name="pole tekstowe 37"/>
+          <p:cNvSpPr txBox="1"/>
+          <p:nvPr/>
+        </p:nvSpPr>
+        <p:spPr>
+          <a:xfrm>
+            <a:off x="3563888" y="3429000"/>
+            <a:ext cx="1152128" cy="307777"/>
+          </a:xfrm>
+          <a:prstGeom prst="rect">
+            <a:avLst/>
+          </a:prstGeom>
+          <a:noFill/>
+        </p:spPr>
+        <p:txBody>
+          <a:bodyPr wrap="square" rtlCol="0">
+            <a:spAutoFit/>
+          </a:bodyPr>
+          <a:lstStyle/>
+          <a:p>
+            <a:pPr algn="ctr"/>
+            <a:r>
+              <a:rPr lang="pl-PL" sz="1400" dirty="0" smtClean="0"/>
+              <a:t>zbiornik</a:t>
+            </a:r>
+            <a:endParaRPr lang="pl-PL" sz="1400" dirty="0"/>
+          </a:p>
+        </p:txBody>
+      </p:sp>
+      <p:cxnSp>
+        <p:nvCxnSpPr>
+          <p:cNvPr id="39" name="Łącznik prosty ze strzałką 38"/>
+          <p:cNvCxnSpPr>
+            <a:stCxn id="37" idx="0"/>
+            <a:endCxn id="17" idx="2"/>
+          </p:cNvCxnSpPr>
+          <p:nvPr/>
+        </p:nvCxnSpPr>
+        <p:spPr>
+          <a:xfrm flipH="1" flipV="1">
+            <a:off x="539552" y="2852936"/>
+            <a:ext cx="36512" cy="576064"/>
+          </a:xfrm>
+          <a:prstGeom prst="straightConnector1">
+            <a:avLst/>
+          </a:prstGeom>
+          <a:ln>
+            <a:solidFill>
+              <a:schemeClr val="tx1"/>
+            </a:solidFill>
+            <a:tailEnd type="triangle"/>
+          </a:ln>
+        </p:spPr>
+        <p:style>
+          <a:lnRef idx="1">
+            <a:schemeClr val="accent1"/>
+          </a:lnRef>
+          <a:fillRef idx="0">
+            <a:schemeClr val="accent1"/>
+          </a:fillRef>
+          <a:effectRef idx="0">
+            <a:schemeClr val="accent1"/>
+          </a:effectRef>
+          <a:fontRef idx="minor">
+            <a:schemeClr val="tx1"/>
+          </a:fontRef>
+        </p:style>
+      </p:cxnSp>
+      <p:cxnSp>
+        <p:nvCxnSpPr>
+          <p:cNvPr id="42" name="Łącznik prosty ze strzałką 41"/>
+          <p:cNvCxnSpPr>
+            <a:stCxn id="37" idx="0"/>
+            <a:endCxn id="18" idx="2"/>
+          </p:cNvCxnSpPr>
+          <p:nvPr/>
+        </p:nvCxnSpPr>
+        <p:spPr>
+          <a:xfrm flipV="1">
+            <a:off x="576064" y="2852936"/>
+            <a:ext cx="260028" cy="576064"/>
+          </a:xfrm>
+          <a:prstGeom prst="straightConnector1">
+            <a:avLst/>
+          </a:prstGeom>
+          <a:ln>
+            <a:solidFill>
+              <a:schemeClr val="tx1"/>
+            </a:solidFill>
+            <a:tailEnd type="triangle"/>
+          </a:ln>
+        </p:spPr>
+        <p:style>
+          <a:lnRef idx="1">
+            <a:schemeClr val="accent1"/>
+          </a:lnRef>
+          <a:fillRef idx="0">
+            <a:schemeClr val="accent1"/>
+          </a:fillRef>
+          <a:effectRef idx="0">
+            <a:schemeClr val="accent1"/>
+          </a:effectRef>
+          <a:fontRef idx="minor">
+            <a:schemeClr val="tx1"/>
+          </a:fontRef>
+        </p:style>
+      </p:cxnSp>
+      <p:cxnSp>
+        <p:nvCxnSpPr>
+          <p:cNvPr id="45" name="Łącznik prosty ze strzałką 44"/>
+          <p:cNvCxnSpPr>
+            <a:stCxn id="37" idx="0"/>
+            <a:endCxn id="19" idx="2"/>
+          </p:cNvCxnSpPr>
+          <p:nvPr/>
+        </p:nvCxnSpPr>
+        <p:spPr>
+          <a:xfrm flipV="1">
+            <a:off x="576064" y="2852936"/>
+            <a:ext cx="548060" cy="576064"/>
+          </a:xfrm>
+          <a:prstGeom prst="straightConnector1">
+            <a:avLst/>
+          </a:prstGeom>
+          <a:ln>
+            <a:solidFill>
+              <a:schemeClr val="tx1"/>
+            </a:solidFill>
+            <a:tailEnd type="triangle"/>
+          </a:ln>
+        </p:spPr>
+        <p:style>
+          <a:lnRef idx="1">
+            <a:schemeClr val="accent1"/>
+          </a:lnRef>
+          <a:fillRef idx="0">
+            <a:schemeClr val="accent1"/>
+          </a:fillRef>
+          <a:effectRef idx="0">
+            <a:schemeClr val="accent1"/>
+          </a:effectRef>
+          <a:fontRef idx="minor">
+            <a:schemeClr val="tx1"/>
+          </a:fontRef>
+        </p:style>
+      </p:cxnSp>
+      <p:cxnSp>
+        <p:nvCxnSpPr>
+          <p:cNvPr id="48" name="Łącznik prosty ze strzałką 47"/>
+          <p:cNvCxnSpPr>
+            <a:stCxn id="37" idx="0"/>
+            <a:endCxn id="20" idx="2"/>
+          </p:cNvCxnSpPr>
+          <p:nvPr/>
+        </p:nvCxnSpPr>
+        <p:spPr>
+          <a:xfrm flipV="1">
+            <a:off x="576064" y="2852936"/>
+            <a:ext cx="836092" cy="576064"/>
+          </a:xfrm>
+          <a:prstGeom prst="straightConnector1">
+            <a:avLst/>
+          </a:prstGeom>
+          <a:ln>
+            <a:solidFill>
+              <a:schemeClr val="tx1"/>
+            </a:solidFill>
+            <a:tailEnd type="triangle"/>
+          </a:ln>
+        </p:spPr>
+        <p:style>
+          <a:lnRef idx="1">
+            <a:schemeClr val="accent1"/>
+          </a:lnRef>
+          <a:fillRef idx="0">
+            <a:schemeClr val="accent1"/>
+          </a:fillRef>
+          <a:effectRef idx="0">
+            <a:schemeClr val="accent1"/>
+          </a:effectRef>
+          <a:fontRef idx="minor">
+            <a:schemeClr val="tx1"/>
+          </a:fontRef>
+        </p:style>
+      </p:cxnSp>
+      <p:cxnSp>
+        <p:nvCxnSpPr>
+          <p:cNvPr id="51" name="Łącznik prosty ze strzałką 50"/>
+          <p:cNvCxnSpPr>
+            <a:stCxn id="38" idx="0"/>
+          </p:cNvCxnSpPr>
+          <p:nvPr/>
+        </p:nvCxnSpPr>
+        <p:spPr>
+          <a:xfrm flipH="1" flipV="1">
+            <a:off x="3707904" y="3284984"/>
+            <a:ext cx="432048" cy="144016"/>
+          </a:xfrm>
+          <a:prstGeom prst="straightConnector1">
+            <a:avLst/>
+          </a:prstGeom>
+          <a:ln>
+            <a:solidFill>
+              <a:schemeClr val="tx1"/>
+            </a:solidFill>
+            <a:tailEnd type="triangle"/>
           </a:ln>
         </p:spPr>
         <p:style>

</xml_diff>

<commit_message>
Update jeszcze raz ze zmiana rysunku
</commit_message>
<xml_diff>
--- a/00_IMG_IK.pptx
+++ b/00_IMG_IK.pptx
@@ -298,7 +298,7 @@
             <a:fld id="{66221E02-25CB-4963-84BC-0813985E7D90}" type="datetimeFigureOut">
               <a:rPr lang="pl-PL" smtClean="0"/>
               <a:pPr/>
-              <a:t>2015-04-25</a:t>
+              <a:t>2015-04-28</a:t>
             </a:fld>
             <a:endParaRPr lang="pl-PL"/>
           </a:p>
@@ -465,7 +465,7 @@
             <a:fld id="{66221E02-25CB-4963-84BC-0813985E7D90}" type="datetimeFigureOut">
               <a:rPr lang="pl-PL" smtClean="0"/>
               <a:pPr/>
-              <a:t>2015-04-25</a:t>
+              <a:t>2015-04-28</a:t>
             </a:fld>
             <a:endParaRPr lang="pl-PL"/>
           </a:p>
@@ -642,7 +642,7 @@
             <a:fld id="{66221E02-25CB-4963-84BC-0813985E7D90}" type="datetimeFigureOut">
               <a:rPr lang="pl-PL" smtClean="0"/>
               <a:pPr/>
-              <a:t>2015-04-25</a:t>
+              <a:t>2015-04-28</a:t>
             </a:fld>
             <a:endParaRPr lang="pl-PL"/>
           </a:p>
@@ -809,7 +809,7 @@
             <a:fld id="{66221E02-25CB-4963-84BC-0813985E7D90}" type="datetimeFigureOut">
               <a:rPr lang="pl-PL" smtClean="0"/>
               <a:pPr/>
-              <a:t>2015-04-25</a:t>
+              <a:t>2015-04-28</a:t>
             </a:fld>
             <a:endParaRPr lang="pl-PL"/>
           </a:p>
@@ -1052,7 +1052,7 @@
             <a:fld id="{66221E02-25CB-4963-84BC-0813985E7D90}" type="datetimeFigureOut">
               <a:rPr lang="pl-PL" smtClean="0"/>
               <a:pPr/>
-              <a:t>2015-04-25</a:t>
+              <a:t>2015-04-28</a:t>
             </a:fld>
             <a:endParaRPr lang="pl-PL"/>
           </a:p>
@@ -1337,7 +1337,7 @@
             <a:fld id="{66221E02-25CB-4963-84BC-0813985E7D90}" type="datetimeFigureOut">
               <a:rPr lang="pl-PL" smtClean="0"/>
               <a:pPr/>
-              <a:t>2015-04-25</a:t>
+              <a:t>2015-04-28</a:t>
             </a:fld>
             <a:endParaRPr lang="pl-PL"/>
           </a:p>
@@ -1756,7 +1756,7 @@
             <a:fld id="{66221E02-25CB-4963-84BC-0813985E7D90}" type="datetimeFigureOut">
               <a:rPr lang="pl-PL" smtClean="0"/>
               <a:pPr/>
-              <a:t>2015-04-25</a:t>
+              <a:t>2015-04-28</a:t>
             </a:fld>
             <a:endParaRPr lang="pl-PL"/>
           </a:p>
@@ -1871,7 +1871,7 @@
             <a:fld id="{66221E02-25CB-4963-84BC-0813985E7D90}" type="datetimeFigureOut">
               <a:rPr lang="pl-PL" smtClean="0"/>
               <a:pPr/>
-              <a:t>2015-04-25</a:t>
+              <a:t>2015-04-28</a:t>
             </a:fld>
             <a:endParaRPr lang="pl-PL"/>
           </a:p>
@@ -1963,7 +1963,7 @@
             <a:fld id="{66221E02-25CB-4963-84BC-0813985E7D90}" type="datetimeFigureOut">
               <a:rPr lang="pl-PL" smtClean="0"/>
               <a:pPr/>
-              <a:t>2015-04-25</a:t>
+              <a:t>2015-04-28</a:t>
             </a:fld>
             <a:endParaRPr lang="pl-PL"/>
           </a:p>
@@ -2237,7 +2237,7 @@
             <a:fld id="{66221E02-25CB-4963-84BC-0813985E7D90}" type="datetimeFigureOut">
               <a:rPr lang="pl-PL" smtClean="0"/>
               <a:pPr/>
-              <a:t>2015-04-25</a:t>
+              <a:t>2015-04-28</a:t>
             </a:fld>
             <a:endParaRPr lang="pl-PL"/>
           </a:p>
@@ -2487,7 +2487,7 @@
             <a:fld id="{66221E02-25CB-4963-84BC-0813985E7D90}" type="datetimeFigureOut">
               <a:rPr lang="pl-PL" smtClean="0"/>
               <a:pPr/>
-              <a:t>2015-04-25</a:t>
+              <a:t>2015-04-28</a:t>
             </a:fld>
             <a:endParaRPr lang="pl-PL"/>
           </a:p>
@@ -2697,7 +2697,7 @@
             <a:fld id="{66221E02-25CB-4963-84BC-0813985E7D90}" type="datetimeFigureOut">
               <a:rPr lang="pl-PL" smtClean="0"/>
               <a:pPr/>
-              <a:t>2015-04-25</a:t>
+              <a:t>2015-04-28</a:t>
             </a:fld>
             <a:endParaRPr lang="pl-PL"/>
           </a:p>
@@ -3347,7 +3347,7 @@
           </a:prstGeom>
           <a:ln w="127000">
             <a:solidFill>
-              <a:srgbClr val="FFC000"/>
+              <a:srgbClr val="00B0F0"/>
             </a:solidFill>
           </a:ln>
         </p:spPr>
@@ -3441,7 +3441,7 @@
                   <a:srgbClr val="FF0000"/>
                 </a:gs>
                 <a:gs pos="100000">
-                  <a:srgbClr val="FFC000"/>
+                  <a:srgbClr val="00B0F0"/>
                 </a:gs>
                 <a:gs pos="100000">
                   <a:schemeClr val="accent1">
@@ -3520,7 +3520,7 @@
           </a:prstGeom>
           <a:ln w="127000">
             <a:solidFill>
-              <a:srgbClr val="FFC000"/>
+              <a:srgbClr val="00B0F0"/>
             </a:solidFill>
           </a:ln>
         </p:spPr>
@@ -3630,7 +3630,7 @@
           <a:gradFill>
             <a:gsLst>
               <a:gs pos="0">
-                <a:srgbClr val="FFC000"/>
+                <a:srgbClr val="00B0F0"/>
               </a:gs>
               <a:gs pos="100000">
                 <a:srgbClr val="FF0000"/>
@@ -6234,7 +6234,7 @@
                   <a:srgbClr val="FF0000"/>
                 </a:gs>
                 <a:gs pos="100000">
-                  <a:srgbClr val="FFC000"/>
+                  <a:srgbClr val="00B0F0"/>
                 </a:gs>
                 <a:gs pos="100000">
                   <a:schemeClr val="accent1">
@@ -19502,7 +19502,7 @@
           <a:blip r:embed="rId2" cstate="print">
             <a:extLst>
               <a:ext uri="{28A0092B-C50C-407E-A947-70E740481C1C}">
-                <a14:useLocalDpi xmlns="" xmlns:wpc="http://schemas.microsoft.com/office/word/2010/wordprocessingCanvas" xmlns:mc="http://schemas.openxmlformats.org/markup-compatibility/2006" xmlns:o="urn:schemas-microsoft-com:office:office" xmlns:m="http://schemas.openxmlformats.org/officeDocument/2006/math" xmlns:v="urn:schemas-microsoft-com:vml" xmlns:wp14="http://schemas.microsoft.com/office/word/2010/wordprocessingDrawing" xmlns:wp="http://schemas.openxmlformats.org/drawingml/2006/wordprocessingDrawing" xmlns:w10="urn:schemas-microsoft-com:office:word" xmlns:w="http://schemas.openxmlformats.org/wordprocessingml/2006/main" xmlns:w14="http://schemas.microsoft.com/office/word/2010/wordml" xmlns:w15="http://schemas.microsoft.com/office/word/2012/wordml" xmlns:wpg="http://schemas.microsoft.com/office/word/2010/wordprocessingGroup" xmlns:wpi="http://schemas.microsoft.com/office/word/2010/wordprocessingInk" xmlns:wne="http://schemas.microsoft.com/office/word/2006/wordml" xmlns:wps="http://schemas.microsoft.com/office/word/2010/wordprocessingShape" xmlns:a14="http://schemas.microsoft.com/office/drawing/2010/main" xmlns:pic="http://schemas.openxmlformats.org/drawingml/2006/picture" xmlns:lc="http://schemas.openxmlformats.org/drawingml/2006/lockedCanvas" val="0"/>
+                <a14:useLocalDpi xmlns:lc="http://schemas.openxmlformats.org/drawingml/2006/lockedCanvas" xmlns:pic="http://schemas.openxmlformats.org/drawingml/2006/picture" xmlns:a14="http://schemas.microsoft.com/office/drawing/2010/main" xmlns:wps="http://schemas.microsoft.com/office/word/2010/wordprocessingShape" xmlns:wne="http://schemas.microsoft.com/office/word/2006/wordml" xmlns:wpi="http://schemas.microsoft.com/office/word/2010/wordprocessingInk" xmlns:wpg="http://schemas.microsoft.com/office/word/2010/wordprocessingGroup" xmlns:w15="http://schemas.microsoft.com/office/word/2012/wordml" xmlns:w14="http://schemas.microsoft.com/office/word/2010/wordml" xmlns:w="http://schemas.openxmlformats.org/wordprocessingml/2006/main" xmlns:w10="urn:schemas-microsoft-com:office:word" xmlns:wp="http://schemas.openxmlformats.org/drawingml/2006/wordprocessingDrawing" xmlns:wp14="http://schemas.microsoft.com/office/word/2010/wordprocessingDrawing" xmlns:v="urn:schemas-microsoft-com:vml" xmlns:m="http://schemas.openxmlformats.org/officeDocument/2006/math" xmlns:o="urn:schemas-microsoft-com:office:office" xmlns:mc="http://schemas.openxmlformats.org/markup-compatibility/2006" xmlns:wpc="http://schemas.microsoft.com/office/word/2010/wordprocessingCanvas" xmlns="" val="0"/>
               </a:ext>
             </a:extLst>
           </a:blip>
@@ -19522,7 +19522,7 @@
           </a:ln>
           <a:extLst>
             <a:ext uri="{53640926-AAD7-44D8-BBD7-CCE9431645EC}">
-              <a14:shadowObscured xmlns="" xmlns:wpc="http://schemas.microsoft.com/office/word/2010/wordprocessingCanvas" xmlns:mc="http://schemas.openxmlformats.org/markup-compatibility/2006" xmlns:o="urn:schemas-microsoft-com:office:office" xmlns:m="http://schemas.openxmlformats.org/officeDocument/2006/math" xmlns:v="urn:schemas-microsoft-com:vml" xmlns:wp14="http://schemas.microsoft.com/office/word/2010/wordprocessingDrawing" xmlns:wp="http://schemas.openxmlformats.org/drawingml/2006/wordprocessingDrawing" xmlns:w10="urn:schemas-microsoft-com:office:word" xmlns:w="http://schemas.openxmlformats.org/wordprocessingml/2006/main" xmlns:w14="http://schemas.microsoft.com/office/word/2010/wordml" xmlns:w15="http://schemas.microsoft.com/office/word/2012/wordml" xmlns:wpg="http://schemas.microsoft.com/office/word/2010/wordprocessingGroup" xmlns:wpi="http://schemas.microsoft.com/office/word/2010/wordprocessingInk" xmlns:wne="http://schemas.microsoft.com/office/word/2006/wordml" xmlns:wps="http://schemas.microsoft.com/office/word/2010/wordprocessingShape" xmlns:a14="http://schemas.microsoft.com/office/drawing/2010/main" xmlns:pic="http://schemas.openxmlformats.org/drawingml/2006/picture" xmlns:lc="http://schemas.openxmlformats.org/drawingml/2006/lockedCanvas"/>
+              <a14:shadowObscured xmlns:lc="http://schemas.openxmlformats.org/drawingml/2006/lockedCanvas" xmlns:pic="http://schemas.openxmlformats.org/drawingml/2006/picture" xmlns:a14="http://schemas.microsoft.com/office/drawing/2010/main" xmlns:wps="http://schemas.microsoft.com/office/word/2010/wordprocessingShape" xmlns:wne="http://schemas.microsoft.com/office/word/2006/wordml" xmlns:wpi="http://schemas.microsoft.com/office/word/2010/wordprocessingInk" xmlns:wpg="http://schemas.microsoft.com/office/word/2010/wordprocessingGroup" xmlns:w15="http://schemas.microsoft.com/office/word/2012/wordml" xmlns:w14="http://schemas.microsoft.com/office/word/2010/wordml" xmlns:w="http://schemas.openxmlformats.org/wordprocessingml/2006/main" xmlns:w10="urn:schemas-microsoft-com:office:word" xmlns:wp="http://schemas.openxmlformats.org/drawingml/2006/wordprocessingDrawing" xmlns:wp14="http://schemas.microsoft.com/office/word/2010/wordprocessingDrawing" xmlns:v="urn:schemas-microsoft-com:vml" xmlns:m="http://schemas.openxmlformats.org/officeDocument/2006/math" xmlns:o="urn:schemas-microsoft-com:office:office" xmlns:mc="http://schemas.openxmlformats.org/markup-compatibility/2006" xmlns:wpc="http://schemas.microsoft.com/office/word/2010/wordprocessingCanvas" xmlns=""/>
             </a:ext>
           </a:extLst>
         </p:spPr>
@@ -20163,7 +20163,7 @@
           <a:blip r:embed="rId2" cstate="print">
             <a:extLst>
               <a:ext uri="{28A0092B-C50C-407E-A947-70E740481C1C}">
-                <a14:useLocalDpi xmlns="" xmlns:wpc="http://schemas.microsoft.com/office/word/2010/wordprocessingCanvas" xmlns:mc="http://schemas.openxmlformats.org/markup-compatibility/2006" xmlns:o="urn:schemas-microsoft-com:office:office" xmlns:m="http://schemas.openxmlformats.org/officeDocument/2006/math" xmlns:v="urn:schemas-microsoft-com:vml" xmlns:wp14="http://schemas.microsoft.com/office/word/2010/wordprocessingDrawing" xmlns:wp="http://schemas.openxmlformats.org/drawingml/2006/wordprocessingDrawing" xmlns:w10="urn:schemas-microsoft-com:office:word" xmlns:w="http://schemas.openxmlformats.org/wordprocessingml/2006/main" xmlns:w14="http://schemas.microsoft.com/office/word/2010/wordml" xmlns:w15="http://schemas.microsoft.com/office/word/2012/wordml" xmlns:wpg="http://schemas.microsoft.com/office/word/2010/wordprocessingGroup" xmlns:wpi="http://schemas.microsoft.com/office/word/2010/wordprocessingInk" xmlns:wne="http://schemas.microsoft.com/office/word/2006/wordml" xmlns:wps="http://schemas.microsoft.com/office/word/2010/wordprocessingShape" xmlns:a14="http://schemas.microsoft.com/office/drawing/2010/main" xmlns:pic="http://schemas.openxmlformats.org/drawingml/2006/picture" xmlns:lc="http://schemas.openxmlformats.org/drawingml/2006/lockedCanvas" val="0"/>
+                <a14:useLocalDpi xmlns:lc="http://schemas.openxmlformats.org/drawingml/2006/lockedCanvas" xmlns:pic="http://schemas.openxmlformats.org/drawingml/2006/picture" xmlns:a14="http://schemas.microsoft.com/office/drawing/2010/main" xmlns:wps="http://schemas.microsoft.com/office/word/2010/wordprocessingShape" xmlns:wne="http://schemas.microsoft.com/office/word/2006/wordml" xmlns:wpi="http://schemas.microsoft.com/office/word/2010/wordprocessingInk" xmlns:wpg="http://schemas.microsoft.com/office/word/2010/wordprocessingGroup" xmlns:w15="http://schemas.microsoft.com/office/word/2012/wordml" xmlns:w14="http://schemas.microsoft.com/office/word/2010/wordml" xmlns:w="http://schemas.openxmlformats.org/wordprocessingml/2006/main" xmlns:w10="urn:schemas-microsoft-com:office:word" xmlns:wp="http://schemas.openxmlformats.org/drawingml/2006/wordprocessingDrawing" xmlns:wp14="http://schemas.microsoft.com/office/word/2010/wordprocessingDrawing" xmlns:v="urn:schemas-microsoft-com:vml" xmlns:m="http://schemas.openxmlformats.org/officeDocument/2006/math" xmlns:o="urn:schemas-microsoft-com:office:office" xmlns:mc="http://schemas.openxmlformats.org/markup-compatibility/2006" xmlns:wpc="http://schemas.microsoft.com/office/word/2010/wordprocessingCanvas" xmlns="" val="0"/>
               </a:ext>
             </a:extLst>
           </a:blip>
@@ -20184,7 +20184,7 @@
           </a:ln>
           <a:extLst>
             <a:ext uri="{53640926-AAD7-44D8-BBD7-CCE9431645EC}">
-              <a14:shadowObscured xmlns="" xmlns:wpc="http://schemas.microsoft.com/office/word/2010/wordprocessingCanvas" xmlns:mc="http://schemas.openxmlformats.org/markup-compatibility/2006" xmlns:o="urn:schemas-microsoft-com:office:office" xmlns:m="http://schemas.openxmlformats.org/officeDocument/2006/math" xmlns:v="urn:schemas-microsoft-com:vml" xmlns:wp14="http://schemas.microsoft.com/office/word/2010/wordprocessingDrawing" xmlns:wp="http://schemas.openxmlformats.org/drawingml/2006/wordprocessingDrawing" xmlns:w10="urn:schemas-microsoft-com:office:word" xmlns:w="http://schemas.openxmlformats.org/wordprocessingml/2006/main" xmlns:w14="http://schemas.microsoft.com/office/word/2010/wordml" xmlns:w15="http://schemas.microsoft.com/office/word/2012/wordml" xmlns:wpg="http://schemas.microsoft.com/office/word/2010/wordprocessingGroup" xmlns:wpi="http://schemas.microsoft.com/office/word/2010/wordprocessingInk" xmlns:wne="http://schemas.microsoft.com/office/word/2006/wordml" xmlns:wps="http://schemas.microsoft.com/office/word/2010/wordprocessingShape" xmlns:a14="http://schemas.microsoft.com/office/drawing/2010/main" xmlns:pic="http://schemas.openxmlformats.org/drawingml/2006/picture" xmlns:lc="http://schemas.openxmlformats.org/drawingml/2006/lockedCanvas"/>
+              <a14:shadowObscured xmlns:lc="http://schemas.openxmlformats.org/drawingml/2006/lockedCanvas" xmlns:pic="http://schemas.openxmlformats.org/drawingml/2006/picture" xmlns:a14="http://schemas.microsoft.com/office/drawing/2010/main" xmlns:wps="http://schemas.microsoft.com/office/word/2010/wordprocessingShape" xmlns:wne="http://schemas.microsoft.com/office/word/2006/wordml" xmlns:wpi="http://schemas.microsoft.com/office/word/2010/wordprocessingInk" xmlns:wpg="http://schemas.microsoft.com/office/word/2010/wordprocessingGroup" xmlns:w15="http://schemas.microsoft.com/office/word/2012/wordml" xmlns:w14="http://schemas.microsoft.com/office/word/2010/wordml" xmlns:w="http://schemas.openxmlformats.org/wordprocessingml/2006/main" xmlns:w10="urn:schemas-microsoft-com:office:word" xmlns:wp="http://schemas.openxmlformats.org/drawingml/2006/wordprocessingDrawing" xmlns:wp14="http://schemas.microsoft.com/office/word/2010/wordprocessingDrawing" xmlns:v="urn:schemas-microsoft-com:vml" xmlns:m="http://schemas.openxmlformats.org/officeDocument/2006/math" xmlns:o="urn:schemas-microsoft-com:office:office" xmlns:mc="http://schemas.openxmlformats.org/markup-compatibility/2006" xmlns:wpc="http://schemas.microsoft.com/office/word/2010/wordprocessingCanvas" xmlns=""/>
             </a:ext>
           </a:extLst>
         </p:spPr>

</xml_diff>